<commit_message>
added mobile app slides and survey slide to beginning and end
</commit_message>
<xml_diff>
--- a/connect2016/developer/04/04.pptx
+++ b/connect2016/developer/04/04.pptx
@@ -6,10 +6,10 @@
     <p:sldMasterId id="2147483684" r:id="rId2"/>
   </p:sldMasterIdLst>
   <p:notesMasterIdLst>
-    <p:notesMasterId r:id="rId15"/>
+    <p:notesMasterId r:id="rId16"/>
   </p:notesMasterIdLst>
   <p:handoutMasterIdLst>
-    <p:handoutMasterId r:id="rId16"/>
+    <p:handoutMasterId r:id="rId17"/>
   </p:handoutMasterIdLst>
   <p:sldIdLst>
     <p:sldId id="444" r:id="rId3"/>
@@ -24,6 +24,7 @@
     <p:sldId id="492" r:id="rId12"/>
     <p:sldId id="493" r:id="rId13"/>
     <p:sldId id="484" r:id="rId14"/>
+    <p:sldId id="494" r:id="rId15"/>
   </p:sldIdLst>
   <p:sldSz cx="9144000" cy="5143500" type="screen16x9"/>
   <p:notesSz cx="6858000" cy="9144000"/>
@@ -139,6 +140,7 @@
             <p14:sldId id="492"/>
             <p14:sldId id="493"/>
             <p14:sldId id="484"/>
+            <p14:sldId id="494"/>
           </p14:sldIdLst>
         </p14:section>
       </p14:sectionLst>
@@ -267,7 +269,7 @@
           <a:p>
             <a:fld id="{B5389E1E-C654-E943-9883-792E99AD7287}" type="datetimeFigureOut">
               <a:rPr lang="en-US" smtClean="0"/>
-              <a:t>10/24/2016</a:t>
+              <a:t>11/3/2016</a:t>
             </a:fld>
             <a:endParaRPr lang="en-US"/>
           </a:p>
@@ -433,7 +435,7 @@
           <a:p>
             <a:fld id="{9920D99B-2862-464A-984E-65BFC5FC0BBC}" type="datetimeFigureOut">
               <a:rPr lang="en-US" smtClean="0"/>
-              <a:t>10/24/2016</a:t>
+              <a:t>11/3/2016</a:t>
             </a:fld>
             <a:endParaRPr lang="en-US"/>
           </a:p>
@@ -1875,6 +1877,339 @@
 
 <file path=ppt/slideLayouts/slideLayout10.xml><?xml version="1.0" encoding="utf-8"?>
 <p:sldLayout xmlns:a="http://schemas.openxmlformats.org/drawingml/2006/main" xmlns:r="http://schemas.openxmlformats.org/officeDocument/2006/relationships" xmlns:p="http://schemas.openxmlformats.org/presentationml/2006/main" preserve="1" userDrawn="1">
+  <p:cSld name="1_Demo, Video etc. &quot;special&quot; slides">
+    <p:bg>
+      <p:bgPr>
+        <a:gradFill>
+          <a:gsLst>
+            <a:gs pos="0">
+              <a:schemeClr val="tx1"/>
+            </a:gs>
+            <a:gs pos="50000">
+              <a:srgbClr val="0070C0"/>
+            </a:gs>
+            <a:gs pos="100000">
+              <a:srgbClr val="7030A0"/>
+            </a:gs>
+          </a:gsLst>
+          <a:lin ang="2700000" scaled="0"/>
+        </a:gradFill>
+        <a:effectLst/>
+      </p:bgPr>
+    </p:bg>
+    <p:spTree>
+      <p:nvGrpSpPr>
+        <p:cNvPr id="1" name=""/>
+        <p:cNvGrpSpPr/>
+        <p:nvPr/>
+      </p:nvGrpSpPr>
+      <p:grpSpPr>
+        <a:xfrm>
+          <a:off x="0" y="0"/>
+          <a:ext cx="0" cy="0"/>
+          <a:chOff x="0" y="0"/>
+          <a:chExt cx="0" cy="0"/>
+        </a:xfrm>
+      </p:grpSpPr>
+      <p:sp>
+        <p:nvSpPr>
+          <p:cNvPr id="2" name="Title 1"/>
+          <p:cNvSpPr>
+            <a:spLocks noGrp="1"/>
+          </p:cNvSpPr>
+          <p:nvPr>
+            <p:ph type="ctrTitle"/>
+          </p:nvPr>
+        </p:nvSpPr>
+        <p:spPr>
+          <a:xfrm>
+            <a:off x="838200" y="1428750"/>
+            <a:ext cx="7043208" cy="1142621"/>
+          </a:xfrm>
+        </p:spPr>
+        <p:txBody>
+          <a:bodyPr anchor="t" anchorCtr="0">
+            <a:noAutofit/>
+          </a:bodyPr>
+          <a:lstStyle>
+            <a:lvl1pPr algn="l" defTabSz="685772" rtl="0" eaLnBrk="1" latinLnBrk="0" hangingPunct="1">
+              <a:lnSpc>
+                <a:spcPct val="90000"/>
+              </a:lnSpc>
+              <a:spcBef>
+                <a:spcPct val="0"/>
+              </a:spcBef>
+              <a:buNone/>
+              <a:defRPr lang="en-US" sz="4050" b="0" kern="1200" cap="none" spc="-113" dirty="0">
+                <a:ln w="3175">
+                  <a:noFill/>
+                </a:ln>
+                <a:gradFill flip="none" rotWithShape="1">
+                  <a:gsLst>
+                    <a:gs pos="0">
+                      <a:schemeClr val="tx1"/>
+                    </a:gs>
+                    <a:gs pos="86000">
+                      <a:schemeClr val="tx1"/>
+                    </a:gs>
+                  </a:gsLst>
+                  <a:lin ang="5400000" scaled="0"/>
+                  <a:tileRect/>
+                </a:gradFill>
+                <a:effectLst/>
+                <a:latin typeface="+mj-lt"/>
+                <a:ea typeface="+mn-ea"/>
+                <a:cs typeface="Arial" charset="0"/>
+              </a:defRPr>
+            </a:lvl1pPr>
+          </a:lstStyle>
+          <a:p>
+            <a:r>
+              <a:rPr lang="en-US"/>
+              <a:t>Click to edit Master title style</a:t>
+            </a:r>
+            <a:endParaRPr lang="en-US" dirty="0"/>
+          </a:p>
+        </p:txBody>
+      </p:sp>
+      <p:sp>
+        <p:nvSpPr>
+          <p:cNvPr id="3" name="Subtitle 2"/>
+          <p:cNvSpPr>
+            <a:spLocks noGrp="1"/>
+          </p:cNvSpPr>
+          <p:nvPr>
+            <p:ph type="subTitle" idx="1"/>
+          </p:nvPr>
+        </p:nvSpPr>
+        <p:spPr>
+          <a:xfrm>
+            <a:off x="838200" y="3257550"/>
+            <a:ext cx="3429000" cy="346249"/>
+          </a:xfrm>
+        </p:spPr>
+        <p:txBody>
+          <a:bodyPr>
+            <a:noAutofit/>
+          </a:bodyPr>
+          <a:lstStyle>
+            <a:lvl1pPr marL="0" indent="0" algn="l" defTabSz="685772" rtl="0" eaLnBrk="1" latinLnBrk="0" hangingPunct="1">
+              <a:lnSpc>
+                <a:spcPct val="90000"/>
+              </a:lnSpc>
+              <a:spcBef>
+                <a:spcPts val="0"/>
+              </a:spcBef>
+              <a:buSzPct val="85000"/>
+              <a:buFontTx/>
+              <a:buNone/>
+              <a:defRPr lang="en-US" sz="2400" kern="1200" dirty="0">
+                <a:gradFill>
+                  <a:gsLst>
+                    <a:gs pos="0">
+                      <a:schemeClr val="accent1">
+                        <a:lumMod val="40000"/>
+                        <a:lumOff val="60000"/>
+                      </a:schemeClr>
+                    </a:gs>
+                    <a:gs pos="86000">
+                      <a:schemeClr val="accent1">
+                        <a:lumMod val="40000"/>
+                        <a:lumOff val="60000"/>
+                      </a:schemeClr>
+                    </a:gs>
+                  </a:gsLst>
+                  <a:lin ang="5400000" scaled="0"/>
+                </a:gradFill>
+                <a:latin typeface="+mn-lt"/>
+                <a:ea typeface="+mn-ea"/>
+                <a:cs typeface="+mn-cs"/>
+              </a:defRPr>
+            </a:lvl1pPr>
+            <a:lvl2pPr marL="342887" indent="0" algn="ctr">
+              <a:buNone/>
+              <a:defRPr>
+                <a:solidFill>
+                  <a:schemeClr val="tx1">
+                    <a:tint val="75000"/>
+                  </a:schemeClr>
+                </a:solidFill>
+              </a:defRPr>
+            </a:lvl2pPr>
+            <a:lvl3pPr marL="685772" indent="0" algn="ctr">
+              <a:buNone/>
+              <a:defRPr>
+                <a:solidFill>
+                  <a:schemeClr val="tx1">
+                    <a:tint val="75000"/>
+                  </a:schemeClr>
+                </a:solidFill>
+              </a:defRPr>
+            </a:lvl3pPr>
+            <a:lvl4pPr marL="1028659" indent="0" algn="ctr">
+              <a:buNone/>
+              <a:defRPr>
+                <a:solidFill>
+                  <a:schemeClr val="tx1">
+                    <a:tint val="75000"/>
+                  </a:schemeClr>
+                </a:solidFill>
+              </a:defRPr>
+            </a:lvl4pPr>
+            <a:lvl5pPr marL="1371545" indent="0" algn="ctr">
+              <a:buNone/>
+              <a:defRPr>
+                <a:solidFill>
+                  <a:schemeClr val="tx1">
+                    <a:tint val="75000"/>
+                  </a:schemeClr>
+                </a:solidFill>
+              </a:defRPr>
+            </a:lvl5pPr>
+            <a:lvl6pPr marL="1714432" indent="0" algn="ctr">
+              <a:buNone/>
+              <a:defRPr>
+                <a:solidFill>
+                  <a:schemeClr val="tx1">
+                    <a:tint val="75000"/>
+                  </a:schemeClr>
+                </a:solidFill>
+              </a:defRPr>
+            </a:lvl6pPr>
+            <a:lvl7pPr marL="2057318" indent="0" algn="ctr">
+              <a:buNone/>
+              <a:defRPr>
+                <a:solidFill>
+                  <a:schemeClr val="tx1">
+                    <a:tint val="75000"/>
+                  </a:schemeClr>
+                </a:solidFill>
+              </a:defRPr>
+            </a:lvl7pPr>
+            <a:lvl8pPr marL="2400204" indent="0" algn="ctr">
+              <a:buNone/>
+              <a:defRPr>
+                <a:solidFill>
+                  <a:schemeClr val="tx1">
+                    <a:tint val="75000"/>
+                  </a:schemeClr>
+                </a:solidFill>
+              </a:defRPr>
+            </a:lvl8pPr>
+            <a:lvl9pPr marL="2743091" indent="0" algn="ctr">
+              <a:buNone/>
+              <a:defRPr>
+                <a:solidFill>
+                  <a:schemeClr val="tx1">
+                    <a:tint val="75000"/>
+                  </a:schemeClr>
+                </a:solidFill>
+              </a:defRPr>
+            </a:lvl9pPr>
+          </a:lstStyle>
+          <a:p>
+            <a:r>
+              <a:rPr lang="en-US"/>
+              <a:t>Click to edit Master subtitle style</a:t>
+            </a:r>
+            <a:endParaRPr lang="en-US" dirty="0"/>
+          </a:p>
+        </p:txBody>
+      </p:sp>
+      <p:sp>
+        <p:nvSpPr>
+          <p:cNvPr id="7" name="Text Placeholder 6"/>
+          <p:cNvSpPr>
+            <a:spLocks noGrp="1"/>
+          </p:cNvSpPr>
+          <p:nvPr>
+            <p:ph type="body" sz="quarter" idx="10" hasCustomPrompt="1"/>
+          </p:nvPr>
+        </p:nvSpPr>
+        <p:spPr>
+          <a:xfrm>
+            <a:off x="1072886" y="171450"/>
+            <a:ext cx="7690114" cy="1038746"/>
+          </a:xfrm>
+        </p:spPr>
+        <p:txBody>
+          <a:bodyPr anchor="t" anchorCtr="0">
+            <a:noAutofit/>
+            <a:scene3d>
+              <a:camera prst="orthographicFront"/>
+              <a:lightRig rig="flat" dir="t"/>
+            </a:scene3d>
+            <a:sp3d>
+              <a:contourClr>
+                <a:schemeClr val="tx2"/>
+              </a:contourClr>
+            </a:sp3d>
+          </a:bodyPr>
+          <a:lstStyle>
+            <a:lvl1pPr marL="0" indent="0" algn="r">
+              <a:buFont typeface="Arial" pitchFamily="34" charset="0"/>
+              <a:buNone/>
+              <a:defRPr kumimoji="0" lang="en-US" sz="8250" b="1" i="1" u="none" strike="noStrike" kern="1200" cap="none" spc="-482" normalizeH="0" baseline="0" noProof="0" dirty="0" smtClean="0">
+                <a:ln w="11430"/>
+                <a:gradFill>
+                  <a:gsLst>
+                    <a:gs pos="0">
+                      <a:schemeClr val="tx1"/>
+                    </a:gs>
+                    <a:gs pos="88000">
+                      <a:schemeClr val="tx1">
+                        <a:alpha val="50000"/>
+                      </a:schemeClr>
+                    </a:gs>
+                  </a:gsLst>
+                  <a:lin ang="5400000"/>
+                </a:gradFill>
+                <a:effectLst/>
+                <a:uLnTx/>
+                <a:uFillTx/>
+                <a:latin typeface="Segoe UI" pitchFamily="34" charset="0"/>
+                <a:ea typeface="+mn-ea"/>
+                <a:cs typeface="+mn-cs"/>
+              </a:defRPr>
+            </a:lvl1pPr>
+          </a:lstStyle>
+          <a:p>
+            <a:pPr marL="0" lvl="0" indent="0" algn="r" defTabSz="685772" rtl="0" eaLnBrk="1" latinLnBrk="0" hangingPunct="1">
+              <a:lnSpc>
+                <a:spcPct val="90000"/>
+              </a:lnSpc>
+              <a:spcBef>
+                <a:spcPct val="20000"/>
+              </a:spcBef>
+              <a:buSzPct val="85000"/>
+              <a:buFont typeface="Arial" pitchFamily="34" charset="0"/>
+              <a:buNone/>
+            </a:pPr>
+            <a:r>
+              <a:rPr lang="en-US" dirty="0"/>
+              <a:t>click to…</a:t>
+            </a:r>
+          </a:p>
+        </p:txBody>
+      </p:sp>
+    </p:spTree>
+    <p:extLst>
+      <p:ext uri="{BB962C8B-B14F-4D97-AF65-F5344CB8AC3E}">
+        <p14:creationId xmlns:p14="http://schemas.microsoft.com/office/powerpoint/2010/main" val="1728899118"/>
+      </p:ext>
+    </p:extLst>
+  </p:cSld>
+  <p:clrMapOvr>
+    <a:masterClrMapping/>
+  </p:clrMapOvr>
+  <p:transition>
+    <p:fade/>
+  </p:transition>
+</p:sldLayout>
+</file>
+
+<file path=ppt/slideLayouts/slideLayout11.xml><?xml version="1.0" encoding="utf-8"?>
+<p:sldLayout xmlns:a="http://schemas.openxmlformats.org/drawingml/2006/main" xmlns:r="http://schemas.openxmlformats.org/officeDocument/2006/relationships" xmlns:p="http://schemas.openxmlformats.org/presentationml/2006/main" preserve="1" userDrawn="1">
   <p:cSld name="1_Title and Content">
     <p:spTree>
       <p:nvGrpSpPr>
@@ -1991,7 +2326,7 @@
 </p:sldLayout>
 </file>
 
-<file path=ppt/slideLayouts/slideLayout11.xml><?xml version="1.0" encoding="utf-8"?>
+<file path=ppt/slideLayouts/slideLayout12.xml><?xml version="1.0" encoding="utf-8"?>
 <p:sldLayout xmlns:a="http://schemas.openxmlformats.org/drawingml/2006/main" xmlns:r="http://schemas.openxmlformats.org/officeDocument/2006/relationships" xmlns:p="http://schemas.openxmlformats.org/presentationml/2006/main" type="obj" preserve="1">
   <p:cSld name="Title and Content">
     <p:spTree>
@@ -2158,7 +2493,7 @@
 </p:sldLayout>
 </file>
 
-<file path=ppt/slideLayouts/slideLayout12.xml><?xml version="1.0" encoding="utf-8"?>
+<file path=ppt/slideLayouts/slideLayout13.xml><?xml version="1.0" encoding="utf-8"?>
 <p:sldLayout xmlns:a="http://schemas.openxmlformats.org/drawingml/2006/main" xmlns:r="http://schemas.openxmlformats.org/officeDocument/2006/relationships" xmlns:p="http://schemas.openxmlformats.org/presentationml/2006/main" type="twoObj" preserve="1">
   <p:cSld name="Two Content">
     <p:spTree>
@@ -2413,7 +2748,7 @@
 </p:sldLayout>
 </file>
 
-<file path=ppt/slideLayouts/slideLayout13.xml><?xml version="1.0" encoding="utf-8"?>
+<file path=ppt/slideLayouts/slideLayout14.xml><?xml version="1.0" encoding="utf-8"?>
 <p:sldLayout xmlns:a="http://schemas.openxmlformats.org/drawingml/2006/main" xmlns:r="http://schemas.openxmlformats.org/officeDocument/2006/relationships" xmlns:p="http://schemas.openxmlformats.org/presentationml/2006/main" type="twoTxTwoObj" preserve="1">
   <p:cSld name="Comparison">
     <p:spTree>
@@ -2785,7 +3120,7 @@
 </p:sldLayout>
 </file>
 
-<file path=ppt/slideLayouts/slideLayout14.xml><?xml version="1.0" encoding="utf-8"?>
+<file path=ppt/slideLayouts/slideLayout15.xml><?xml version="1.0" encoding="utf-8"?>
 <p:sldLayout xmlns:a="http://schemas.openxmlformats.org/drawingml/2006/main" xmlns:r="http://schemas.openxmlformats.org/officeDocument/2006/relationships" xmlns:p="http://schemas.openxmlformats.org/presentationml/2006/main" type="titleOnly" preserve="1">
   <p:cSld name="Title Only">
     <p:spTree>
@@ -2841,7 +3176,7 @@
 </p:sldLayout>
 </file>
 
-<file path=ppt/slideLayouts/slideLayout15.xml><?xml version="1.0" encoding="utf-8"?>
+<file path=ppt/slideLayouts/slideLayout16.xml><?xml version="1.0" encoding="utf-8"?>
 <p:sldLayout xmlns:a="http://schemas.openxmlformats.org/drawingml/2006/main" xmlns:r="http://schemas.openxmlformats.org/officeDocument/2006/relationships" xmlns:p="http://schemas.openxmlformats.org/presentationml/2006/main" type="blank" preserve="1">
   <p:cSld name="Blank">
     <p:spTree>
@@ -2874,7 +3209,7 @@
 </p:sldLayout>
 </file>
 
-<file path=ppt/slideLayouts/slideLayout16.xml><?xml version="1.0" encoding="utf-8"?>
+<file path=ppt/slideLayouts/slideLayout17.xml><?xml version="1.0" encoding="utf-8"?>
 <p:sldLayout xmlns:a="http://schemas.openxmlformats.org/drawingml/2006/main" xmlns:r="http://schemas.openxmlformats.org/officeDocument/2006/relationships" xmlns:p="http://schemas.openxmlformats.org/presentationml/2006/main" preserve="1" userDrawn="1">
   <p:cSld name="WALKIN - Prints in GRAYSCALE">
     <p:bg bwMode="ltGray">
@@ -2926,7 +3261,7 @@
 </p:sldLayout>
 </file>
 
-<file path=ppt/slideLayouts/slideLayout17.xml><?xml version="1.0" encoding="utf-8"?>
+<file path=ppt/slideLayouts/slideLayout18.xml><?xml version="1.0" encoding="utf-8"?>
 <p:sldLayout xmlns:a="http://schemas.openxmlformats.org/drawingml/2006/main" xmlns:r="http://schemas.openxmlformats.org/officeDocument/2006/relationships" xmlns:p="http://schemas.openxmlformats.org/presentationml/2006/main" preserve="1" userDrawn="1">
   <p:cSld name="No Camera Layout">
     <p:spTree>
@@ -3396,7 +3731,7 @@
 </p:sldLayout>
 </file>
 
-<file path=ppt/slideLayouts/slideLayout18.xml><?xml version="1.0" encoding="utf-8"?>
+<file path=ppt/slideLayouts/slideLayout19.xml><?xml version="1.0" encoding="utf-8"?>
 <p:sldLayout xmlns:a="http://schemas.openxmlformats.org/drawingml/2006/main" xmlns:r="http://schemas.openxmlformats.org/officeDocument/2006/relationships" xmlns:p="http://schemas.openxmlformats.org/presentationml/2006/main">
   <p:cSld name="3_Title and Content">
     <p:bg bwMode="black">
@@ -3607,150 +3942,6 @@
     <p:extLst>
       <p:ext uri="{BB962C8B-B14F-4D97-AF65-F5344CB8AC3E}">
         <p14:creationId xmlns:p14="http://schemas.microsoft.com/office/powerpoint/2010/main" val="170738095"/>
-      </p:ext>
-    </p:extLst>
-  </p:cSld>
-  <p:clrMapOvr>
-    <a:masterClrMapping/>
-  </p:clrMapOvr>
-  <p:transition>
-    <p:fade/>
-  </p:transition>
-</p:sldLayout>
-</file>
-
-<file path=ppt/slideLayouts/slideLayout19.xml><?xml version="1.0" encoding="utf-8"?>
-<p:sldLayout xmlns:a="http://schemas.openxmlformats.org/drawingml/2006/main" xmlns:r="http://schemas.openxmlformats.org/officeDocument/2006/relationships" xmlns:p="http://schemas.openxmlformats.org/presentationml/2006/main">
-  <p:cSld name="Use for slides with Software Code">
-    <p:spTree>
-      <p:nvGrpSpPr>
-        <p:cNvPr id="1" name=""/>
-        <p:cNvGrpSpPr/>
-        <p:nvPr/>
-      </p:nvGrpSpPr>
-      <p:grpSpPr>
-        <a:xfrm>
-          <a:off x="0" y="0"/>
-          <a:ext cx="0" cy="0"/>
-          <a:chOff x="0" y="0"/>
-          <a:chExt cx="0" cy="0"/>
-        </a:xfrm>
-      </p:grpSpPr>
-      <p:sp>
-        <p:nvSpPr>
-          <p:cNvPr id="2" name="Title 1"/>
-          <p:cNvSpPr>
-            <a:spLocks noGrp="1"/>
-          </p:cNvSpPr>
-          <p:nvPr>
-            <p:ph type="title"/>
-          </p:nvPr>
-        </p:nvSpPr>
-        <p:spPr/>
-        <p:txBody>
-          <a:bodyPr/>
-          <a:lstStyle/>
-          <a:p>
-            <a:r>
-              <a:rPr lang="en-US"/>
-              <a:t>Click to edit Master title style</a:t>
-            </a:r>
-            <a:endParaRPr lang="en-US" dirty="0"/>
-          </a:p>
-        </p:txBody>
-      </p:sp>
-      <p:sp>
-        <p:nvSpPr>
-          <p:cNvPr id="6" name="Text Placeholder 5"/>
-          <p:cNvSpPr>
-            <a:spLocks noGrp="1"/>
-          </p:cNvSpPr>
-          <p:nvPr>
-            <p:ph type="body" sz="quarter" idx="10"/>
-          </p:nvPr>
-        </p:nvSpPr>
-        <p:spPr>
-          <a:xfrm>
-            <a:off x="722313" y="1428750"/>
-            <a:ext cx="8040688" cy="1500411"/>
-          </a:xfrm>
-        </p:spPr>
-        <p:txBody>
-          <a:bodyPr/>
-          <a:lstStyle>
-            <a:lvl1pPr>
-              <a:lnSpc>
-                <a:spcPct val="90000"/>
-              </a:lnSpc>
-              <a:defRPr/>
-            </a:lvl1pPr>
-            <a:lvl2pPr>
-              <a:lnSpc>
-                <a:spcPct val="90000"/>
-              </a:lnSpc>
-              <a:defRPr/>
-            </a:lvl2pPr>
-            <a:lvl3pPr>
-              <a:lnSpc>
-                <a:spcPct val="90000"/>
-              </a:lnSpc>
-              <a:defRPr/>
-            </a:lvl3pPr>
-            <a:lvl4pPr>
-              <a:lnSpc>
-                <a:spcPct val="90000"/>
-              </a:lnSpc>
-              <a:defRPr/>
-            </a:lvl4pPr>
-            <a:lvl5pPr>
-              <a:lnSpc>
-                <a:spcPct val="90000"/>
-              </a:lnSpc>
-              <a:defRPr/>
-            </a:lvl5pPr>
-          </a:lstStyle>
-          <a:p>
-            <a:pPr lvl="0"/>
-            <a:r>
-              <a:rPr lang="en-US"/>
-              <a:t>Click to edit Master text styles</a:t>
-            </a:r>
-          </a:p>
-          <a:p>
-            <a:pPr lvl="1"/>
-            <a:r>
-              <a:rPr lang="en-US"/>
-              <a:t>Second level</a:t>
-            </a:r>
-          </a:p>
-          <a:p>
-            <a:pPr lvl="2"/>
-            <a:r>
-              <a:rPr lang="en-US"/>
-              <a:t>Third level</a:t>
-            </a:r>
-          </a:p>
-          <a:p>
-            <a:pPr lvl="3"/>
-            <a:r>
-              <a:rPr lang="en-US"/>
-              <a:t>Fourth level</a:t>
-            </a:r>
-          </a:p>
-          <a:p>
-            <a:pPr lvl="4"/>
-            <a:r>
-              <a:rPr lang="en-US"/>
-              <a:t>Fifth level</a:t>
-            </a:r>
-            <a:endParaRPr lang="en-US" dirty="0"/>
-          </a:p>
-        </p:txBody>
-      </p:sp>
-    </p:spTree>
-    <p:extLst>
-      <p:ext uri="{BB962C8B-B14F-4D97-AF65-F5344CB8AC3E}">
-        <p14:creationId xmlns:p14="http://schemas.microsoft.com/office/powerpoint/2010/main" val="1553819463"/>
       </p:ext>
     </p:extLst>
   </p:cSld>
@@ -4219,6 +4410,150 @@
   <p:clrMapOvr>
     <a:masterClrMapping/>
   </p:clrMapOvr>
+</p:sldLayout>
+</file>
+
+<file path=ppt/slideLayouts/slideLayout20.xml><?xml version="1.0" encoding="utf-8"?>
+<p:sldLayout xmlns:a="http://schemas.openxmlformats.org/drawingml/2006/main" xmlns:r="http://schemas.openxmlformats.org/officeDocument/2006/relationships" xmlns:p="http://schemas.openxmlformats.org/presentationml/2006/main">
+  <p:cSld name="Use for slides with Software Code">
+    <p:spTree>
+      <p:nvGrpSpPr>
+        <p:cNvPr id="1" name=""/>
+        <p:cNvGrpSpPr/>
+        <p:nvPr/>
+      </p:nvGrpSpPr>
+      <p:grpSpPr>
+        <a:xfrm>
+          <a:off x="0" y="0"/>
+          <a:ext cx="0" cy="0"/>
+          <a:chOff x="0" y="0"/>
+          <a:chExt cx="0" cy="0"/>
+        </a:xfrm>
+      </p:grpSpPr>
+      <p:sp>
+        <p:nvSpPr>
+          <p:cNvPr id="2" name="Title 1"/>
+          <p:cNvSpPr>
+            <a:spLocks noGrp="1"/>
+          </p:cNvSpPr>
+          <p:nvPr>
+            <p:ph type="title"/>
+          </p:nvPr>
+        </p:nvSpPr>
+        <p:spPr/>
+        <p:txBody>
+          <a:bodyPr/>
+          <a:lstStyle/>
+          <a:p>
+            <a:r>
+              <a:rPr lang="en-US"/>
+              <a:t>Click to edit Master title style</a:t>
+            </a:r>
+            <a:endParaRPr lang="en-US" dirty="0"/>
+          </a:p>
+        </p:txBody>
+      </p:sp>
+      <p:sp>
+        <p:nvSpPr>
+          <p:cNvPr id="6" name="Text Placeholder 5"/>
+          <p:cNvSpPr>
+            <a:spLocks noGrp="1"/>
+          </p:cNvSpPr>
+          <p:nvPr>
+            <p:ph type="body" sz="quarter" idx="10"/>
+          </p:nvPr>
+        </p:nvSpPr>
+        <p:spPr>
+          <a:xfrm>
+            <a:off x="722313" y="1428750"/>
+            <a:ext cx="8040688" cy="1500411"/>
+          </a:xfrm>
+        </p:spPr>
+        <p:txBody>
+          <a:bodyPr/>
+          <a:lstStyle>
+            <a:lvl1pPr>
+              <a:lnSpc>
+                <a:spcPct val="90000"/>
+              </a:lnSpc>
+              <a:defRPr/>
+            </a:lvl1pPr>
+            <a:lvl2pPr>
+              <a:lnSpc>
+                <a:spcPct val="90000"/>
+              </a:lnSpc>
+              <a:defRPr/>
+            </a:lvl2pPr>
+            <a:lvl3pPr>
+              <a:lnSpc>
+                <a:spcPct val="90000"/>
+              </a:lnSpc>
+              <a:defRPr/>
+            </a:lvl3pPr>
+            <a:lvl4pPr>
+              <a:lnSpc>
+                <a:spcPct val="90000"/>
+              </a:lnSpc>
+              <a:defRPr/>
+            </a:lvl4pPr>
+            <a:lvl5pPr>
+              <a:lnSpc>
+                <a:spcPct val="90000"/>
+              </a:lnSpc>
+              <a:defRPr/>
+            </a:lvl5pPr>
+          </a:lstStyle>
+          <a:p>
+            <a:pPr lvl="0"/>
+            <a:r>
+              <a:rPr lang="en-US"/>
+              <a:t>Click to edit Master text styles</a:t>
+            </a:r>
+          </a:p>
+          <a:p>
+            <a:pPr lvl="1"/>
+            <a:r>
+              <a:rPr lang="en-US"/>
+              <a:t>Second level</a:t>
+            </a:r>
+          </a:p>
+          <a:p>
+            <a:pPr lvl="2"/>
+            <a:r>
+              <a:rPr lang="en-US"/>
+              <a:t>Third level</a:t>
+            </a:r>
+          </a:p>
+          <a:p>
+            <a:pPr lvl="3"/>
+            <a:r>
+              <a:rPr lang="en-US"/>
+              <a:t>Fourth level</a:t>
+            </a:r>
+          </a:p>
+          <a:p>
+            <a:pPr lvl="4"/>
+            <a:r>
+              <a:rPr lang="en-US"/>
+              <a:t>Fifth level</a:t>
+            </a:r>
+            <a:endParaRPr lang="en-US" dirty="0"/>
+          </a:p>
+        </p:txBody>
+      </p:sp>
+    </p:spTree>
+    <p:extLst>
+      <p:ext uri="{BB962C8B-B14F-4D97-AF65-F5344CB8AC3E}">
+        <p14:creationId xmlns:p14="http://schemas.microsoft.com/office/powerpoint/2010/main" val="1553819463"/>
+      </p:ext>
+    </p:extLst>
+  </p:cSld>
+  <p:clrMapOvr>
+    <a:masterClrMapping/>
+  </p:clrMapOvr>
+  <p:transition>
+    <p:fade/>
+  </p:transition>
 </p:sldLayout>
 </file>
 
@@ -5837,6 +6172,260 @@
 </file>
 
 <file path=ppt/slideLayouts/slideLayout8.xml><?xml version="1.0" encoding="utf-8"?>
+<p:sldLayout xmlns:a="http://schemas.openxmlformats.org/drawingml/2006/main" xmlns:r="http://schemas.openxmlformats.org/officeDocument/2006/relationships" xmlns:p="http://schemas.openxmlformats.org/presentationml/2006/main" userDrawn="1">
+  <p:cSld name="1_Blank">
+    <p:spTree>
+      <p:nvGrpSpPr>
+        <p:cNvPr id="1" name=""/>
+        <p:cNvGrpSpPr/>
+        <p:nvPr/>
+      </p:nvGrpSpPr>
+      <p:grpSpPr>
+        <a:xfrm>
+          <a:off x="0" y="0"/>
+          <a:ext cx="0" cy="0"/>
+          <a:chOff x="0" y="0"/>
+          <a:chExt cx="0" cy="0"/>
+        </a:xfrm>
+      </p:grpSpPr>
+      <p:sp>
+        <p:nvSpPr>
+          <p:cNvPr id="4" name="Slide Number Placeholder 3"/>
+          <p:cNvSpPr>
+            <a:spLocks noGrp="1"/>
+          </p:cNvSpPr>
+          <p:nvPr>
+            <p:ph type="sldNum" sz="quarter" idx="12"/>
+          </p:nvPr>
+        </p:nvSpPr>
+        <p:spPr/>
+        <p:txBody>
+          <a:bodyPr/>
+          <a:lstStyle/>
+          <a:p>
+            <a:fld id="{45AFAF25-1148-2B40-A455-FDDA161F44AC}" type="slidenum">
+              <a:rPr lang="en-US" smtClean="0"/>
+              <a:t>‹#›</a:t>
+            </a:fld>
+            <a:endParaRPr lang="en-US"/>
+          </a:p>
+        </p:txBody>
+      </p:sp>
+      <p:sp>
+        <p:nvSpPr>
+          <p:cNvPr id="7" name="Title 1"/>
+          <p:cNvSpPr>
+            <a:spLocks noGrp="1"/>
+          </p:cNvSpPr>
+          <p:nvPr>
+            <p:ph type="ctrTitle"/>
+          </p:nvPr>
+        </p:nvSpPr>
+        <p:spPr>
+          <a:xfrm>
+            <a:off x="2152433" y="842772"/>
+            <a:ext cx="4968955" cy="1790700"/>
+          </a:xfrm>
+          <a:prstGeom prst="rect">
+            <a:avLst/>
+          </a:prstGeom>
+        </p:spPr>
+        <p:txBody>
+          <a:bodyPr anchor="b"/>
+          <a:lstStyle>
+            <a:lvl1pPr algn="ctr">
+              <a:defRPr sz="3000" b="1">
+                <a:latin typeface="Corbel" charset="0"/>
+                <a:ea typeface="Corbel" charset="0"/>
+                <a:cs typeface="Corbel" charset="0"/>
+              </a:defRPr>
+            </a:lvl1pPr>
+          </a:lstStyle>
+          <a:p>
+            <a:r>
+              <a:rPr lang="en-US" dirty="0"/>
+              <a:t>Click to edit Master title style</a:t>
+            </a:r>
+          </a:p>
+        </p:txBody>
+      </p:sp>
+      <p:sp>
+        <p:nvSpPr>
+          <p:cNvPr id="8" name="Subtitle 2"/>
+          <p:cNvSpPr>
+            <a:spLocks noGrp="1"/>
+          </p:cNvSpPr>
+          <p:nvPr>
+            <p:ph type="subTitle" idx="1"/>
+          </p:nvPr>
+        </p:nvSpPr>
+        <p:spPr>
+          <a:xfrm>
+            <a:off x="2152433" y="2662577"/>
+            <a:ext cx="4968955" cy="1241822"/>
+          </a:xfrm>
+          <a:prstGeom prst="rect">
+            <a:avLst/>
+          </a:prstGeom>
+        </p:spPr>
+        <p:txBody>
+          <a:bodyPr/>
+          <a:lstStyle>
+            <a:lvl1pPr marL="0" indent="0" algn="ctr">
+              <a:buNone/>
+              <a:defRPr sz="1800">
+                <a:latin typeface="Corbel" charset="0"/>
+                <a:ea typeface="Corbel" charset="0"/>
+                <a:cs typeface="Corbel" charset="0"/>
+              </a:defRPr>
+            </a:lvl1pPr>
+            <a:lvl2pPr marL="342900" indent="0" algn="ctr">
+              <a:buNone/>
+              <a:defRPr sz="1500"/>
+            </a:lvl2pPr>
+            <a:lvl3pPr marL="685800" indent="0" algn="ctr">
+              <a:buNone/>
+              <a:defRPr sz="1350"/>
+            </a:lvl3pPr>
+            <a:lvl4pPr marL="1028700" indent="0" algn="ctr">
+              <a:buNone/>
+              <a:defRPr sz="1200"/>
+            </a:lvl4pPr>
+            <a:lvl5pPr marL="1371600" indent="0" algn="ctr">
+              <a:buNone/>
+              <a:defRPr sz="1200"/>
+            </a:lvl5pPr>
+            <a:lvl6pPr marL="1714500" indent="0" algn="ctr">
+              <a:buNone/>
+              <a:defRPr sz="1200"/>
+            </a:lvl6pPr>
+            <a:lvl7pPr marL="2057400" indent="0" algn="ctr">
+              <a:buNone/>
+              <a:defRPr sz="1200"/>
+            </a:lvl7pPr>
+            <a:lvl8pPr marL="2400300" indent="0" algn="ctr">
+              <a:buNone/>
+              <a:defRPr sz="1200"/>
+            </a:lvl8pPr>
+            <a:lvl9pPr marL="2743200" indent="0" algn="ctr">
+              <a:buNone/>
+              <a:defRPr sz="1200"/>
+            </a:lvl9pPr>
+          </a:lstStyle>
+          <a:p>
+            <a:r>
+              <a:rPr lang="en-US" dirty="0"/>
+              <a:t>Click to edit Master subtitle style</a:t>
+            </a:r>
+          </a:p>
+        </p:txBody>
+      </p:sp>
+      <p:sp>
+        <p:nvSpPr>
+          <p:cNvPr id="6" name="Rectangle 5"/>
+          <p:cNvSpPr/>
+          <p:nvPr userDrawn="1"/>
+        </p:nvSpPr>
+        <p:spPr>
+          <a:xfrm rot="16200000" flipV="1">
+            <a:off x="-2476500" y="2476500"/>
+            <a:ext cx="5143500" cy="190500"/>
+          </a:xfrm>
+          <a:prstGeom prst="rect">
+            <a:avLst/>
+          </a:prstGeom>
+          <a:gradFill>
+            <a:gsLst>
+              <a:gs pos="0">
+                <a:srgbClr val="00ACE0">
+                  <a:alpha val="30000"/>
+                </a:srgbClr>
+              </a:gs>
+              <a:gs pos="35000">
+                <a:srgbClr val="FF931E">
+                  <a:alpha val="30000"/>
+                </a:srgbClr>
+              </a:gs>
+              <a:gs pos="69000">
+                <a:srgbClr val="FF7BAC">
+                  <a:alpha val="30000"/>
+                </a:srgbClr>
+              </a:gs>
+              <a:gs pos="100000">
+                <a:srgbClr val="FF1D25">
+                  <a:alpha val="30000"/>
+                </a:srgbClr>
+              </a:gs>
+            </a:gsLst>
+            <a:lin ang="0" scaled="0"/>
+          </a:gradFill>
+          <a:ln>
+            <a:noFill/>
+          </a:ln>
+        </p:spPr>
+        <p:style>
+          <a:lnRef idx="2">
+            <a:schemeClr val="accent1">
+              <a:shade val="50000"/>
+            </a:schemeClr>
+          </a:lnRef>
+          <a:fillRef idx="1">
+            <a:schemeClr val="accent1"/>
+          </a:fillRef>
+          <a:effectRef idx="0">
+            <a:schemeClr val="accent1"/>
+          </a:effectRef>
+          <a:fontRef idx="minor">
+            <a:schemeClr val="lt1"/>
+          </a:fontRef>
+        </p:style>
+        <p:txBody>
+          <a:bodyPr rtlCol="0" anchor="ctr"/>
+          <a:lstStyle/>
+          <a:p>
+            <a:pPr algn="ctr"/>
+            <a:endParaRPr lang="en-US" sz="1350"/>
+          </a:p>
+        </p:txBody>
+      </p:sp>
+      <p:pic>
+        <p:nvPicPr>
+          <p:cNvPr id="9" name="Picture 8"/>
+          <p:cNvPicPr>
+            <a:picLocks noChangeAspect="1"/>
+          </p:cNvPicPr>
+          <p:nvPr userDrawn="1"/>
+        </p:nvPicPr>
+        <p:blipFill>
+          <a:blip r:embed="rId2"/>
+          <a:stretch>
+            <a:fillRect/>
+          </a:stretch>
+        </p:blipFill>
+        <p:spPr>
+          <a:xfrm>
+            <a:off x="609110" y="2353967"/>
+            <a:ext cx="493776" cy="493776"/>
+          </a:xfrm>
+          <a:prstGeom prst="rect">
+            <a:avLst/>
+          </a:prstGeom>
+        </p:spPr>
+      </p:pic>
+    </p:spTree>
+    <p:extLst>
+      <p:ext uri="{BB962C8B-B14F-4D97-AF65-F5344CB8AC3E}">
+        <p14:creationId xmlns:p14="http://schemas.microsoft.com/office/powerpoint/2010/main" val="4284930596"/>
+      </p:ext>
+    </p:extLst>
+  </p:cSld>
+  <p:clrMapOvr>
+    <a:masterClrMapping/>
+  </p:clrMapOvr>
+</p:sldLayout>
+</file>
+
+<file path=ppt/slideLayouts/slideLayout9.xml><?xml version="1.0" encoding="utf-8"?>
 <p:sldLayout xmlns:a="http://schemas.openxmlformats.org/drawingml/2006/main" xmlns:r="http://schemas.openxmlformats.org/officeDocument/2006/relationships" xmlns:p="http://schemas.openxmlformats.org/presentationml/2006/main" preserve="1" userDrawn="1">
   <p:cSld name="Title Slide">
     <p:bg>
@@ -6027,339 +6616,6 @@
 </p:sldLayout>
 </file>
 
-<file path=ppt/slideLayouts/slideLayout9.xml><?xml version="1.0" encoding="utf-8"?>
-<p:sldLayout xmlns:a="http://schemas.openxmlformats.org/drawingml/2006/main" xmlns:r="http://schemas.openxmlformats.org/officeDocument/2006/relationships" xmlns:p="http://schemas.openxmlformats.org/presentationml/2006/main" preserve="1" userDrawn="1">
-  <p:cSld name="1_Demo, Video etc. &quot;special&quot; slides">
-    <p:bg>
-      <p:bgPr>
-        <a:gradFill>
-          <a:gsLst>
-            <a:gs pos="0">
-              <a:schemeClr val="tx1"/>
-            </a:gs>
-            <a:gs pos="50000">
-              <a:srgbClr val="0070C0"/>
-            </a:gs>
-            <a:gs pos="100000">
-              <a:srgbClr val="7030A0"/>
-            </a:gs>
-          </a:gsLst>
-          <a:lin ang="2700000" scaled="0"/>
-        </a:gradFill>
-        <a:effectLst/>
-      </p:bgPr>
-    </p:bg>
-    <p:spTree>
-      <p:nvGrpSpPr>
-        <p:cNvPr id="1" name=""/>
-        <p:cNvGrpSpPr/>
-        <p:nvPr/>
-      </p:nvGrpSpPr>
-      <p:grpSpPr>
-        <a:xfrm>
-          <a:off x="0" y="0"/>
-          <a:ext cx="0" cy="0"/>
-          <a:chOff x="0" y="0"/>
-          <a:chExt cx="0" cy="0"/>
-        </a:xfrm>
-      </p:grpSpPr>
-      <p:sp>
-        <p:nvSpPr>
-          <p:cNvPr id="2" name="Title 1"/>
-          <p:cNvSpPr>
-            <a:spLocks noGrp="1"/>
-          </p:cNvSpPr>
-          <p:nvPr>
-            <p:ph type="ctrTitle"/>
-          </p:nvPr>
-        </p:nvSpPr>
-        <p:spPr>
-          <a:xfrm>
-            <a:off x="838200" y="1428750"/>
-            <a:ext cx="7043208" cy="1142621"/>
-          </a:xfrm>
-        </p:spPr>
-        <p:txBody>
-          <a:bodyPr anchor="t" anchorCtr="0">
-            <a:noAutofit/>
-          </a:bodyPr>
-          <a:lstStyle>
-            <a:lvl1pPr algn="l" defTabSz="685772" rtl="0" eaLnBrk="1" latinLnBrk="0" hangingPunct="1">
-              <a:lnSpc>
-                <a:spcPct val="90000"/>
-              </a:lnSpc>
-              <a:spcBef>
-                <a:spcPct val="0"/>
-              </a:spcBef>
-              <a:buNone/>
-              <a:defRPr lang="en-US" sz="4050" b="0" kern="1200" cap="none" spc="-113" dirty="0">
-                <a:ln w="3175">
-                  <a:noFill/>
-                </a:ln>
-                <a:gradFill flip="none" rotWithShape="1">
-                  <a:gsLst>
-                    <a:gs pos="0">
-                      <a:schemeClr val="tx1"/>
-                    </a:gs>
-                    <a:gs pos="86000">
-                      <a:schemeClr val="tx1"/>
-                    </a:gs>
-                  </a:gsLst>
-                  <a:lin ang="5400000" scaled="0"/>
-                  <a:tileRect/>
-                </a:gradFill>
-                <a:effectLst/>
-                <a:latin typeface="+mj-lt"/>
-                <a:ea typeface="+mn-ea"/>
-                <a:cs typeface="Arial" charset="0"/>
-              </a:defRPr>
-            </a:lvl1pPr>
-          </a:lstStyle>
-          <a:p>
-            <a:r>
-              <a:rPr lang="en-US"/>
-              <a:t>Click to edit Master title style</a:t>
-            </a:r>
-            <a:endParaRPr lang="en-US" dirty="0"/>
-          </a:p>
-        </p:txBody>
-      </p:sp>
-      <p:sp>
-        <p:nvSpPr>
-          <p:cNvPr id="3" name="Subtitle 2"/>
-          <p:cNvSpPr>
-            <a:spLocks noGrp="1"/>
-          </p:cNvSpPr>
-          <p:nvPr>
-            <p:ph type="subTitle" idx="1"/>
-          </p:nvPr>
-        </p:nvSpPr>
-        <p:spPr>
-          <a:xfrm>
-            <a:off x="838200" y="3257550"/>
-            <a:ext cx="3429000" cy="346249"/>
-          </a:xfrm>
-        </p:spPr>
-        <p:txBody>
-          <a:bodyPr>
-            <a:noAutofit/>
-          </a:bodyPr>
-          <a:lstStyle>
-            <a:lvl1pPr marL="0" indent="0" algn="l" defTabSz="685772" rtl="0" eaLnBrk="1" latinLnBrk="0" hangingPunct="1">
-              <a:lnSpc>
-                <a:spcPct val="90000"/>
-              </a:lnSpc>
-              <a:spcBef>
-                <a:spcPts val="0"/>
-              </a:spcBef>
-              <a:buSzPct val="85000"/>
-              <a:buFontTx/>
-              <a:buNone/>
-              <a:defRPr lang="en-US" sz="2400" kern="1200" dirty="0">
-                <a:gradFill>
-                  <a:gsLst>
-                    <a:gs pos="0">
-                      <a:schemeClr val="accent1">
-                        <a:lumMod val="40000"/>
-                        <a:lumOff val="60000"/>
-                      </a:schemeClr>
-                    </a:gs>
-                    <a:gs pos="86000">
-                      <a:schemeClr val="accent1">
-                        <a:lumMod val="40000"/>
-                        <a:lumOff val="60000"/>
-                      </a:schemeClr>
-                    </a:gs>
-                  </a:gsLst>
-                  <a:lin ang="5400000" scaled="0"/>
-                </a:gradFill>
-                <a:latin typeface="+mn-lt"/>
-                <a:ea typeface="+mn-ea"/>
-                <a:cs typeface="+mn-cs"/>
-              </a:defRPr>
-            </a:lvl1pPr>
-            <a:lvl2pPr marL="342887" indent="0" algn="ctr">
-              <a:buNone/>
-              <a:defRPr>
-                <a:solidFill>
-                  <a:schemeClr val="tx1">
-                    <a:tint val="75000"/>
-                  </a:schemeClr>
-                </a:solidFill>
-              </a:defRPr>
-            </a:lvl2pPr>
-            <a:lvl3pPr marL="685772" indent="0" algn="ctr">
-              <a:buNone/>
-              <a:defRPr>
-                <a:solidFill>
-                  <a:schemeClr val="tx1">
-                    <a:tint val="75000"/>
-                  </a:schemeClr>
-                </a:solidFill>
-              </a:defRPr>
-            </a:lvl3pPr>
-            <a:lvl4pPr marL="1028659" indent="0" algn="ctr">
-              <a:buNone/>
-              <a:defRPr>
-                <a:solidFill>
-                  <a:schemeClr val="tx1">
-                    <a:tint val="75000"/>
-                  </a:schemeClr>
-                </a:solidFill>
-              </a:defRPr>
-            </a:lvl4pPr>
-            <a:lvl5pPr marL="1371545" indent="0" algn="ctr">
-              <a:buNone/>
-              <a:defRPr>
-                <a:solidFill>
-                  <a:schemeClr val="tx1">
-                    <a:tint val="75000"/>
-                  </a:schemeClr>
-                </a:solidFill>
-              </a:defRPr>
-            </a:lvl5pPr>
-            <a:lvl6pPr marL="1714432" indent="0" algn="ctr">
-              <a:buNone/>
-              <a:defRPr>
-                <a:solidFill>
-                  <a:schemeClr val="tx1">
-                    <a:tint val="75000"/>
-                  </a:schemeClr>
-                </a:solidFill>
-              </a:defRPr>
-            </a:lvl6pPr>
-            <a:lvl7pPr marL="2057318" indent="0" algn="ctr">
-              <a:buNone/>
-              <a:defRPr>
-                <a:solidFill>
-                  <a:schemeClr val="tx1">
-                    <a:tint val="75000"/>
-                  </a:schemeClr>
-                </a:solidFill>
-              </a:defRPr>
-            </a:lvl7pPr>
-            <a:lvl8pPr marL="2400204" indent="0" algn="ctr">
-              <a:buNone/>
-              <a:defRPr>
-                <a:solidFill>
-                  <a:schemeClr val="tx1">
-                    <a:tint val="75000"/>
-                  </a:schemeClr>
-                </a:solidFill>
-              </a:defRPr>
-            </a:lvl8pPr>
-            <a:lvl9pPr marL="2743091" indent="0" algn="ctr">
-              <a:buNone/>
-              <a:defRPr>
-                <a:solidFill>
-                  <a:schemeClr val="tx1">
-                    <a:tint val="75000"/>
-                  </a:schemeClr>
-                </a:solidFill>
-              </a:defRPr>
-            </a:lvl9pPr>
-          </a:lstStyle>
-          <a:p>
-            <a:r>
-              <a:rPr lang="en-US"/>
-              <a:t>Click to edit Master subtitle style</a:t>
-            </a:r>
-            <a:endParaRPr lang="en-US" dirty="0"/>
-          </a:p>
-        </p:txBody>
-      </p:sp>
-      <p:sp>
-        <p:nvSpPr>
-          <p:cNvPr id="7" name="Text Placeholder 6"/>
-          <p:cNvSpPr>
-            <a:spLocks noGrp="1"/>
-          </p:cNvSpPr>
-          <p:nvPr>
-            <p:ph type="body" sz="quarter" idx="10" hasCustomPrompt="1"/>
-          </p:nvPr>
-        </p:nvSpPr>
-        <p:spPr>
-          <a:xfrm>
-            <a:off x="1072886" y="171450"/>
-            <a:ext cx="7690114" cy="1038746"/>
-          </a:xfrm>
-        </p:spPr>
-        <p:txBody>
-          <a:bodyPr anchor="t" anchorCtr="0">
-            <a:noAutofit/>
-            <a:scene3d>
-              <a:camera prst="orthographicFront"/>
-              <a:lightRig rig="flat" dir="t"/>
-            </a:scene3d>
-            <a:sp3d>
-              <a:contourClr>
-                <a:schemeClr val="tx2"/>
-              </a:contourClr>
-            </a:sp3d>
-          </a:bodyPr>
-          <a:lstStyle>
-            <a:lvl1pPr marL="0" indent="0" algn="r">
-              <a:buFont typeface="Arial" pitchFamily="34" charset="0"/>
-              <a:buNone/>
-              <a:defRPr kumimoji="0" lang="en-US" sz="8250" b="1" i="1" u="none" strike="noStrike" kern="1200" cap="none" spc="-482" normalizeH="0" baseline="0" noProof="0" dirty="0" smtClean="0">
-                <a:ln w="11430"/>
-                <a:gradFill>
-                  <a:gsLst>
-                    <a:gs pos="0">
-                      <a:schemeClr val="tx1"/>
-                    </a:gs>
-                    <a:gs pos="88000">
-                      <a:schemeClr val="tx1">
-                        <a:alpha val="50000"/>
-                      </a:schemeClr>
-                    </a:gs>
-                  </a:gsLst>
-                  <a:lin ang="5400000"/>
-                </a:gradFill>
-                <a:effectLst/>
-                <a:uLnTx/>
-                <a:uFillTx/>
-                <a:latin typeface="Segoe UI" pitchFamily="34" charset="0"/>
-                <a:ea typeface="+mn-ea"/>
-                <a:cs typeface="+mn-cs"/>
-              </a:defRPr>
-            </a:lvl1pPr>
-          </a:lstStyle>
-          <a:p>
-            <a:pPr marL="0" lvl="0" indent="0" algn="r" defTabSz="685772" rtl="0" eaLnBrk="1" latinLnBrk="0" hangingPunct="1">
-              <a:lnSpc>
-                <a:spcPct val="90000"/>
-              </a:lnSpc>
-              <a:spcBef>
-                <a:spcPct val="20000"/>
-              </a:spcBef>
-              <a:buSzPct val="85000"/>
-              <a:buFont typeface="Arial" pitchFamily="34" charset="0"/>
-              <a:buNone/>
-            </a:pPr>
-            <a:r>
-              <a:rPr lang="en-US" dirty="0"/>
-              <a:t>click to…</a:t>
-            </a:r>
-          </a:p>
-        </p:txBody>
-      </p:sp>
-    </p:spTree>
-    <p:extLst>
-      <p:ext uri="{BB962C8B-B14F-4D97-AF65-F5344CB8AC3E}">
-        <p14:creationId xmlns:p14="http://schemas.microsoft.com/office/powerpoint/2010/main" val="1728899118"/>
-      </p:ext>
-    </p:extLst>
-  </p:cSld>
-  <p:clrMapOvr>
-    <a:masterClrMapping/>
-  </p:clrMapOvr>
-  <p:transition>
-    <p:fade/>
-  </p:transition>
-</p:sldLayout>
-</file>
-
 <file path=ppt/slideMasters/slideMaster1.xml><?xml version="1.0" encoding="utf-8"?>
 <p:sldMaster xmlns:a="http://schemas.openxmlformats.org/drawingml/2006/main" xmlns:r="http://schemas.openxmlformats.org/officeDocument/2006/relationships" xmlns:p="http://schemas.openxmlformats.org/presentationml/2006/main">
   <p:cSld>
@@ -6566,6 +6822,7 @@
     <p:sldLayoutId id="2147483663" r:id="rId5"/>
     <p:sldLayoutId id="2147483666" r:id="rId6"/>
     <p:sldLayoutId id="2147483674" r:id="rId7"/>
+    <p:sldLayoutId id="2147483697" r:id="rId8"/>
   </p:sldLayoutIdLst>
   <p:hf hdr="0" ftr="0" dt="0"/>
   <p:txStyles>
@@ -7712,6 +7969,238 @@
     <p:extLst>
       <p:ext uri="{BB962C8B-B14F-4D97-AF65-F5344CB8AC3E}">
         <p14:creationId xmlns:p14="http://schemas.microsoft.com/office/powerpoint/2010/main" val="3620921753"/>
+      </p:ext>
+    </p:extLst>
+  </p:cSld>
+  <p:clrMapOvr>
+    <a:masterClrMapping/>
+  </p:clrMapOvr>
+</p:sld>
+</file>
+
+<file path=ppt/slides/slide13.xml><?xml version="1.0" encoding="utf-8"?>
+<p:sld xmlns:a="http://schemas.openxmlformats.org/drawingml/2006/main" xmlns:r="http://schemas.openxmlformats.org/officeDocument/2006/relationships" xmlns:p="http://schemas.openxmlformats.org/presentationml/2006/main">
+  <p:cSld>
+    <p:spTree>
+      <p:nvGrpSpPr>
+        <p:cNvPr id="1" name=""/>
+        <p:cNvGrpSpPr/>
+        <p:nvPr/>
+      </p:nvGrpSpPr>
+      <p:grpSpPr>
+        <a:xfrm>
+          <a:off x="0" y="0"/>
+          <a:ext cx="0" cy="0"/>
+          <a:chOff x="0" y="0"/>
+          <a:chExt cx="0" cy="0"/>
+        </a:xfrm>
+      </p:grpSpPr>
+      <p:sp>
+        <p:nvSpPr>
+          <p:cNvPr id="2" name="Slide Number Placeholder 1"/>
+          <p:cNvSpPr>
+            <a:spLocks noGrp="1"/>
+          </p:cNvSpPr>
+          <p:nvPr>
+            <p:ph type="sldNum" sz="quarter" idx="12"/>
+          </p:nvPr>
+        </p:nvSpPr>
+        <p:spPr/>
+        <p:txBody>
+          <a:bodyPr/>
+          <a:lstStyle/>
+          <a:p>
+            <a:fld id="{45AFAF25-1148-2B40-A455-FDDA161F44AC}" type="slidenum">
+              <a:rPr lang="en-US" smtClean="0"/>
+              <a:t>13</a:t>
+            </a:fld>
+            <a:endParaRPr lang="en-US"/>
+          </a:p>
+        </p:txBody>
+      </p:sp>
+      <p:pic>
+        <p:nvPicPr>
+          <p:cNvPr id="7" name="Picture 6"/>
+          <p:cNvPicPr>
+            <a:picLocks noChangeAspect="1"/>
+          </p:cNvPicPr>
+          <p:nvPr/>
+        </p:nvPicPr>
+        <p:blipFill>
+          <a:blip r:embed="rId2">
+            <a:extLst>
+              <a:ext uri="{28A0092B-C50C-407E-A947-70E740481C1C}">
+                <a14:useLocalDpi xmlns:a14="http://schemas.microsoft.com/office/drawing/2010/main" val="0"/>
+              </a:ext>
+            </a:extLst>
+          </a:blip>
+          <a:stretch>
+            <a:fillRect/>
+          </a:stretch>
+        </p:blipFill>
+        <p:spPr>
+          <a:xfrm>
+            <a:off x="3021513" y="551059"/>
+            <a:ext cx="3100976" cy="691953"/>
+          </a:xfrm>
+          <a:prstGeom prst="rect">
+            <a:avLst/>
+          </a:prstGeom>
+        </p:spPr>
+      </p:pic>
+      <p:sp>
+        <p:nvSpPr>
+          <p:cNvPr id="8" name="Title 1"/>
+          <p:cNvSpPr>
+            <a:spLocks noGrp="1"/>
+          </p:cNvSpPr>
+          <p:nvPr>
+            <p:ph type="ctrTitle"/>
+          </p:nvPr>
+        </p:nvSpPr>
+        <p:spPr>
+          <a:xfrm>
+            <a:off x="1629008" y="1033337"/>
+            <a:ext cx="5885986" cy="1107996"/>
+          </a:xfrm>
+        </p:spPr>
+        <p:txBody>
+          <a:bodyPr wrap="square">
+            <a:spAutoFit/>
+          </a:bodyPr>
+          <a:lstStyle/>
+          <a:p>
+            <a:r>
+              <a:rPr lang="en-US" sz="3300" b="0" dirty="0">
+                <a:solidFill>
+                  <a:srgbClr val="7030A0"/>
+                </a:solidFill>
+                <a:latin typeface="Whitney Book"/>
+                <a:cs typeface="Whitney Book"/>
+              </a:rPr>
+              <a:t>Share your opinion on Couchbase</a:t>
+            </a:r>
+          </a:p>
+        </p:txBody>
+      </p:sp>
+      <p:sp>
+        <p:nvSpPr>
+          <p:cNvPr id="9" name="Rectangle 8"/>
+          <p:cNvSpPr/>
+          <p:nvPr/>
+        </p:nvSpPr>
+        <p:spPr>
+          <a:xfrm>
+            <a:off x="1700856" y="2372842"/>
+            <a:ext cx="3713169" cy="1477328"/>
+          </a:xfrm>
+          <a:prstGeom prst="rect">
+            <a:avLst/>
+          </a:prstGeom>
+        </p:spPr>
+        <p:txBody>
+          <a:bodyPr wrap="square">
+            <a:spAutoFit/>
+          </a:bodyPr>
+          <a:lstStyle/>
+          <a:p>
+            <a:pPr marL="257175" indent="-257175">
+              <a:buAutoNum type="arabicPeriod"/>
+            </a:pPr>
+            <a:r>
+              <a:rPr lang="en-US" dirty="0">
+                <a:latin typeface="Whitney Book"/>
+                <a:cs typeface="Whitney Book"/>
+              </a:rPr>
+              <a:t>Go here: </a:t>
+            </a:r>
+            <a:r>
+              <a:rPr lang="en-US" dirty="0">
+                <a:latin typeface="Whitney Book"/>
+                <a:cs typeface="Whitney Book"/>
+                <a:hlinkClick r:id="rId3"/>
+              </a:rPr>
+              <a:t>http://gtnr.it/2eRxYWn</a:t>
+            </a:r>
+            <a:endParaRPr lang="en-US" dirty="0">
+              <a:latin typeface="Whitney Book"/>
+              <a:cs typeface="Whitney Book"/>
+            </a:endParaRPr>
+          </a:p>
+          <a:p>
+            <a:endParaRPr lang="en-US" dirty="0">
+              <a:latin typeface="Whitney Book"/>
+              <a:cs typeface="Whitney Book"/>
+            </a:endParaRPr>
+          </a:p>
+          <a:p>
+            <a:pPr marL="342900" indent="-342900">
+              <a:buFont typeface="+mj-lt"/>
+              <a:buAutoNum type="arabicPeriod" startAt="2"/>
+            </a:pPr>
+            <a:r>
+              <a:rPr lang="en-US" dirty="0">
+                <a:latin typeface="Whitney Book"/>
+                <a:cs typeface="Whitney Book"/>
+              </a:rPr>
+              <a:t>Create a profile</a:t>
+            </a:r>
+          </a:p>
+          <a:p>
+            <a:endParaRPr lang="en-US" dirty="0">
+              <a:latin typeface="Whitney Book"/>
+              <a:cs typeface="Whitney Book"/>
+            </a:endParaRPr>
+          </a:p>
+          <a:p>
+            <a:pPr marL="342900" indent="-342900">
+              <a:buFont typeface="+mj-lt"/>
+              <a:buAutoNum type="arabicPeriod" startAt="3"/>
+            </a:pPr>
+            <a:r>
+              <a:rPr lang="en-US" dirty="0">
+                <a:latin typeface="Whitney Book"/>
+                <a:cs typeface="Whitney Book"/>
+              </a:rPr>
+              <a:t>Provide feedback (~15 minutes)</a:t>
+            </a:r>
+          </a:p>
+        </p:txBody>
+      </p:sp>
+      <p:pic>
+        <p:nvPicPr>
+          <p:cNvPr id="3" name="Picture 2" descr="static_qr_code_without_logo.jpg"/>
+          <p:cNvPicPr>
+            <a:picLocks noChangeAspect="1"/>
+          </p:cNvPicPr>
+          <p:nvPr/>
+        </p:nvPicPr>
+        <p:blipFill>
+          <a:blip r:embed="rId4">
+            <a:extLst>
+              <a:ext uri="{28A0092B-C50C-407E-A947-70E740481C1C}">
+                <a14:useLocalDpi xmlns:a14="http://schemas.microsoft.com/office/drawing/2010/main" val="0"/>
+              </a:ext>
+            </a:extLst>
+          </a:blip>
+          <a:stretch>
+            <a:fillRect/>
+          </a:stretch>
+        </p:blipFill>
+        <p:spPr>
+          <a:xfrm>
+            <a:off x="5530896" y="2223382"/>
+            <a:ext cx="1818570" cy="1818570"/>
+          </a:xfrm>
+          <a:prstGeom prst="rect">
+            <a:avLst/>
+          </a:prstGeom>
+        </p:spPr>
+      </p:pic>
+    </p:spTree>
+    <p:extLst>
+      <p:ext uri="{BB962C8B-B14F-4D97-AF65-F5344CB8AC3E}">
+        <p14:creationId xmlns:p14="http://schemas.microsoft.com/office/powerpoint/2010/main" val="875240058"/>
       </p:ext>
     </p:extLst>
   </p:cSld>

</xml_diff>